<commit_message>
Update PPT and Word Doc
</commit_message>
<xml_diff>
--- a/Final_Project/Blue_Team_Assignment_11-2 .pptx
+++ b/Final_Project/Blue_Team_Assignment_11-2 .pptx
@@ -350,7 +350,7 @@
           <a:p>
             <a:fld id="{BD7CFBD1-0358-4DBD-A3C8-C700BA589B66}" type="datetimeFigureOut">
               <a:rPr lang="en-US" smtClean="0"/>
-              <a:t>12/15/25</a:t>
+              <a:t>12/17/25</a:t>
             </a:fld>
             <a:endParaRPr lang="en-US"/>
           </a:p>
@@ -1122,7 +1122,7 @@
           <a:p>
             <a:fld id="{53BEF823-48A5-43FC-BE03-E79964288B41}" type="datetimeFigureOut">
               <a:rPr lang="en-US" smtClean="0"/>
-              <a:t>12/15/25</a:t>
+              <a:t>12/17/25</a:t>
             </a:fld>
             <a:endParaRPr lang="en-US" dirty="0"/>
           </a:p>
@@ -1333,7 +1333,7 @@
             <a:fld id="{53BEF823-48A5-43FC-BE03-E79964288B41}" type="datetimeFigureOut">
               <a:rPr lang="en-US" smtClean="0"/>
               <a:pPr algn="r"/>
-              <a:t>12/15/25</a:t>
+              <a:t>12/17/25</a:t>
             </a:fld>
             <a:endParaRPr lang="en-US" dirty="0"/>
           </a:p>
@@ -1548,7 +1548,7 @@
             <a:fld id="{53BEF823-48A5-43FC-BE03-E79964288B41}" type="datetimeFigureOut">
               <a:rPr lang="en-US" smtClean="0"/>
               <a:pPr algn="r"/>
-              <a:t>12/15/25</a:t>
+              <a:t>12/17/25</a:t>
             </a:fld>
             <a:endParaRPr lang="en-US" dirty="0"/>
           </a:p>
@@ -1751,7 +1751,7 @@
             <a:fld id="{53BEF823-48A5-43FC-BE03-E79964288B41}" type="datetimeFigureOut">
               <a:rPr lang="en-US" smtClean="0"/>
               <a:pPr algn="r"/>
-              <a:t>12/15/25</a:t>
+              <a:t>12/17/25</a:t>
             </a:fld>
             <a:endParaRPr lang="en-US" dirty="0"/>
           </a:p>
@@ -2035,7 +2035,7 @@
             <a:fld id="{53BEF823-48A5-43FC-BE03-E79964288B41}" type="datetimeFigureOut">
               <a:rPr lang="en-US" smtClean="0"/>
               <a:pPr algn="r"/>
-              <a:t>12/15/25</a:t>
+              <a:t>12/17/25</a:t>
             </a:fld>
             <a:endParaRPr lang="en-US" dirty="0"/>
           </a:p>
@@ -2279,7 +2279,7 @@
             <a:fld id="{53BEF823-48A5-43FC-BE03-E79964288B41}" type="datetimeFigureOut">
               <a:rPr lang="en-US" smtClean="0"/>
               <a:pPr algn="r"/>
-              <a:t>12/15/25</a:t>
+              <a:t>12/17/25</a:t>
             </a:fld>
             <a:endParaRPr lang="en-US" dirty="0"/>
           </a:p>
@@ -2722,7 +2722,7 @@
             <a:fld id="{53BEF823-48A5-43FC-BE03-E79964288B41}" type="datetimeFigureOut">
               <a:rPr lang="en-US" smtClean="0"/>
               <a:pPr algn="r"/>
-              <a:t>12/15/25</a:t>
+              <a:t>12/17/25</a:t>
             </a:fld>
             <a:endParaRPr lang="en-US" dirty="0"/>
           </a:p>
@@ -2868,7 +2868,7 @@
             <a:fld id="{53BEF823-48A5-43FC-BE03-E79964288B41}" type="datetimeFigureOut">
               <a:rPr lang="en-US" smtClean="0"/>
               <a:pPr algn="r"/>
-              <a:t>12/15/25</a:t>
+              <a:t>12/17/25</a:t>
             </a:fld>
             <a:endParaRPr lang="en-US" dirty="0"/>
           </a:p>
@@ -2986,7 +2986,7 @@
             <a:fld id="{53BEF823-48A5-43FC-BE03-E79964288B41}" type="datetimeFigureOut">
               <a:rPr lang="en-US" smtClean="0"/>
               <a:pPr algn="r"/>
-              <a:t>12/15/25</a:t>
+              <a:t>12/17/25</a:t>
             </a:fld>
             <a:endParaRPr lang="en-US" dirty="0"/>
           </a:p>
@@ -3270,7 +3270,7 @@
             <a:fld id="{53BEF823-48A5-43FC-BE03-E79964288B41}" type="datetimeFigureOut">
               <a:rPr lang="en-US" smtClean="0"/>
               <a:pPr algn="r"/>
-              <a:t>12/15/25</a:t>
+              <a:t>12/17/25</a:t>
             </a:fld>
             <a:endParaRPr lang="en-US" dirty="0"/>
           </a:p>
@@ -3565,7 +3565,7 @@
             <a:fld id="{53BEF823-48A5-43FC-BE03-E79964288B41}" type="datetimeFigureOut">
               <a:rPr lang="en-US" smtClean="0"/>
               <a:pPr algn="r"/>
-              <a:t>12/15/25</a:t>
+              <a:t>12/17/25</a:t>
             </a:fld>
             <a:endParaRPr lang="en-US" dirty="0"/>
           </a:p>
@@ -4060,7 +4060,7 @@
             <a:fld id="{53BEF823-48A5-43FC-BE03-E79964288B41}" type="datetimeFigureOut">
               <a:rPr lang="en-US" smtClean="0"/>
               <a:pPr algn="r"/>
-              <a:t>12/15/25</a:t>
+              <a:t>12/17/25</a:t>
             </a:fld>
             <a:endParaRPr lang="en-US" dirty="0"/>
           </a:p>
@@ -5191,10 +5191,10 @@
       </p:sp>
       <p:pic>
         <p:nvPicPr>
-          <p:cNvPr id="8" name="Picture 7" descr="A screenshot of a computer screen&#10;&#10;AI-generated content may be incorrect.">
-            <a:extLst>
-              <a:ext uri="{FF2B5EF4-FFF2-40B4-BE49-F238E27FC236}">
-                <a16:creationId xmlns:a16="http://schemas.microsoft.com/office/drawing/2014/main" id="{58329C67-8ABB-23E0-A6E9-9709B242F670}"/>
+          <p:cNvPr id="5" name="Picture 4" descr="A screenshot of a computer screen&#10;&#10;AI-generated content may be incorrect.">
+            <a:extLst>
+              <a:ext uri="{FF2B5EF4-FFF2-40B4-BE49-F238E27FC236}">
+                <a16:creationId xmlns:a16="http://schemas.microsoft.com/office/drawing/2014/main" id="{F23F8FF3-1BA8-FF20-DE1E-D3FC0EE29D43}"/>
               </a:ext>
             </a:extLst>
           </p:cNvPr>
@@ -5211,8 +5211,8 @@
         </p:blipFill>
         <p:spPr>
           <a:xfrm>
-            <a:off x="5633544" y="995703"/>
-            <a:ext cx="6353088" cy="3576298"/>
+            <a:off x="5633544" y="1011474"/>
+            <a:ext cx="6404958" cy="3581548"/>
           </a:xfrm>
           <a:prstGeom prst="rect">
             <a:avLst/>

</xml_diff>